<commit_message>
alteração ppt aula curso de férias Python
</commit_message>
<xml_diff>
--- a/01 Classes/Curso de Férias Programação Python - 04Jul2022.pptx
+++ b/01 Classes/Curso de Férias Programação Python - 04Jul2022.pptx
@@ -7813,86 +7813,6 @@
               </a:rPr>
               <a:t>program</a:t>
             </a:r>
-            <a:r>
-              <a:rPr lang="pt-BR" b="1" dirty="0">
-                <a:solidFill>
-                  <a:schemeClr val="tx1"/>
-                </a:solidFill>
-                <a:latin typeface="Times New Roman" panose="02020603050405020304" pitchFamily="18" charset="0"/>
-                <a:cs typeface="Times New Roman" panose="02020603050405020304" pitchFamily="18" charset="0"/>
-              </a:rPr>
-              <a:t> </a:t>
-            </a:r>
-            <a:r>
-              <a:rPr lang="pt-BR" b="1" dirty="0" err="1">
-                <a:solidFill>
-                  <a:schemeClr val="tx1"/>
-                </a:solidFill>
-                <a:latin typeface="Times New Roman" panose="02020603050405020304" pitchFamily="18" charset="0"/>
-                <a:cs typeface="Times New Roman" panose="02020603050405020304" pitchFamily="18" charset="0"/>
-              </a:rPr>
-              <a:t>to</a:t>
-            </a:r>
-            <a:r>
-              <a:rPr lang="pt-BR" b="1" dirty="0">
-                <a:solidFill>
-                  <a:schemeClr val="tx1"/>
-                </a:solidFill>
-                <a:latin typeface="Times New Roman" panose="02020603050405020304" pitchFamily="18" charset="0"/>
-                <a:cs typeface="Times New Roman" panose="02020603050405020304" pitchFamily="18" charset="0"/>
-              </a:rPr>
-              <a:t> swap </a:t>
-            </a:r>
-            <a:r>
-              <a:rPr lang="pt-BR" b="1" dirty="0" err="1">
-                <a:solidFill>
-                  <a:schemeClr val="tx1"/>
-                </a:solidFill>
-                <a:latin typeface="Times New Roman" panose="02020603050405020304" pitchFamily="18" charset="0"/>
-                <a:cs typeface="Times New Roman" panose="02020603050405020304" pitchFamily="18" charset="0"/>
-              </a:rPr>
-              <a:t>two</a:t>
-            </a:r>
-            <a:r>
-              <a:rPr lang="pt-BR" b="1" dirty="0">
-                <a:solidFill>
-                  <a:schemeClr val="tx1"/>
-                </a:solidFill>
-                <a:latin typeface="Times New Roman" panose="02020603050405020304" pitchFamily="18" charset="0"/>
-                <a:cs typeface="Times New Roman" panose="02020603050405020304" pitchFamily="18" charset="0"/>
-              </a:rPr>
-              <a:t> </a:t>
-            </a:r>
-            <a:r>
-              <a:rPr lang="pt-BR" b="1" dirty="0" err="1">
-                <a:solidFill>
-                  <a:schemeClr val="tx1"/>
-                </a:solidFill>
-                <a:latin typeface="Times New Roman" panose="02020603050405020304" pitchFamily="18" charset="0"/>
-                <a:cs typeface="Times New Roman" panose="02020603050405020304" pitchFamily="18" charset="0"/>
-              </a:rPr>
-              <a:t>variables</a:t>
-            </a:r>
-            <a:r>
-              <a:rPr lang="pt-BR" b="1" dirty="0">
-                <a:solidFill>
-                  <a:schemeClr val="tx1"/>
-                </a:solidFill>
-                <a:latin typeface="Times New Roman" panose="02020603050405020304" pitchFamily="18" charset="0"/>
-                <a:cs typeface="Times New Roman" panose="02020603050405020304" pitchFamily="18" charset="0"/>
-              </a:rPr>
-              <a:t>; # </a:t>
-            </a:r>
-            <a:r>
-              <a:rPr lang="pt-BR" b="1" dirty="0" err="1">
-                <a:solidFill>
-                  <a:schemeClr val="tx1"/>
-                </a:solidFill>
-                <a:latin typeface="Times New Roman" panose="02020603050405020304" pitchFamily="18" charset="0"/>
-                <a:cs typeface="Times New Roman" panose="02020603050405020304" pitchFamily="18" charset="0"/>
-              </a:rPr>
-              <a:t>Comment</a:t>
-            </a:r>
             <a:endParaRPr lang="pt-BR" b="1" dirty="0">
               <a:solidFill>
                 <a:schemeClr val="tx1"/>
@@ -8394,7 +8314,7 @@
                 <a:latin typeface="Times New Roman" panose="02020603050405020304" pitchFamily="18" charset="0"/>
                 <a:cs typeface="Times New Roman" panose="02020603050405020304" pitchFamily="18" charset="0"/>
               </a:rPr>
-              <a:t>** =&gt; potência</a:t>
+              <a:t>**  potência</a:t>
             </a:r>
           </a:p>
           <a:p>
@@ -8409,7 +8329,7 @@
                 <a:latin typeface="Times New Roman" panose="02020603050405020304" pitchFamily="18" charset="0"/>
                 <a:cs typeface="Times New Roman" panose="02020603050405020304" pitchFamily="18" charset="0"/>
               </a:rPr>
-              <a:t>*/ =&gt; multiplicação; divisão</a:t>
+              <a:t>*/  multiplicação; divisão</a:t>
             </a:r>
           </a:p>
           <a:p>
@@ -8424,7 +8344,7 @@
                 <a:latin typeface="Times New Roman" panose="02020603050405020304" pitchFamily="18" charset="0"/>
                 <a:cs typeface="Times New Roman" panose="02020603050405020304" pitchFamily="18" charset="0"/>
               </a:rPr>
-              <a:t>// =&gt; divisão inteira</a:t>
+              <a:t>//  divisão inteira</a:t>
             </a:r>
           </a:p>
           <a:p>
@@ -8439,7 +8359,7 @@
                 <a:latin typeface="Times New Roman" panose="02020603050405020304" pitchFamily="18" charset="0"/>
                 <a:cs typeface="Times New Roman" panose="02020603050405020304" pitchFamily="18" charset="0"/>
               </a:rPr>
-              <a:t>% =&gt; resto da divisão</a:t>
+              <a:t>%  resto da divisão</a:t>
             </a:r>
           </a:p>
           <a:p>
@@ -8454,7 +8374,7 @@
                 <a:latin typeface="Times New Roman" panose="02020603050405020304" pitchFamily="18" charset="0"/>
                 <a:cs typeface="Times New Roman" panose="02020603050405020304" pitchFamily="18" charset="0"/>
               </a:rPr>
-              <a:t>+- =&gt; soma; subtração</a:t>
+              <a:t>+-  soma; subtração</a:t>
             </a:r>
           </a:p>
           <a:p>
@@ -8612,7 +8532,7 @@
                 <a:latin typeface="Times New Roman" panose="02020603050405020304" pitchFamily="18" charset="0"/>
                 <a:cs typeface="Times New Roman" panose="02020603050405020304" pitchFamily="18" charset="0"/>
               </a:rPr>
-              <a:t>== =&gt; igual a</a:t>
+              <a:t>==  igual a</a:t>
             </a:r>
           </a:p>
           <a:p>
@@ -8627,7 +8547,7 @@
                 <a:latin typeface="Times New Roman" panose="02020603050405020304" pitchFamily="18" charset="0"/>
                 <a:cs typeface="Times New Roman" panose="02020603050405020304" pitchFamily="18" charset="0"/>
               </a:rPr>
-              <a:t>!= =&gt; diferente</a:t>
+              <a:t>!=  diferente</a:t>
             </a:r>
           </a:p>
           <a:p>
@@ -8642,7 +8562,7 @@
                 <a:latin typeface="Times New Roman" panose="02020603050405020304" pitchFamily="18" charset="0"/>
                 <a:cs typeface="Times New Roman" panose="02020603050405020304" pitchFamily="18" charset="0"/>
               </a:rPr>
-              <a:t>&gt; =&gt; maior</a:t>
+              <a:t>&gt;  maior</a:t>
             </a:r>
           </a:p>
           <a:p>
@@ -8657,7 +8577,7 @@
                 <a:latin typeface="Times New Roman" panose="02020603050405020304" pitchFamily="18" charset="0"/>
                 <a:cs typeface="Times New Roman" panose="02020603050405020304" pitchFamily="18" charset="0"/>
               </a:rPr>
-              <a:t>&lt; =&gt; menor</a:t>
+              <a:t>&lt;  menor</a:t>
             </a:r>
           </a:p>
           <a:p>
@@ -8672,7 +8592,7 @@
                 <a:latin typeface="Times New Roman" panose="02020603050405020304" pitchFamily="18" charset="0"/>
                 <a:cs typeface="Times New Roman" panose="02020603050405020304" pitchFamily="18" charset="0"/>
               </a:rPr>
-              <a:t>&gt;= =&gt; maior igual</a:t>
+              <a:t>&gt;=  maior igual</a:t>
             </a:r>
           </a:p>
           <a:p>
@@ -8687,7 +8607,7 @@
                 <a:latin typeface="Times New Roman" panose="02020603050405020304" pitchFamily="18" charset="0"/>
                 <a:cs typeface="Times New Roman" panose="02020603050405020304" pitchFamily="18" charset="0"/>
               </a:rPr>
-              <a:t>&lt;= =&gt; menor igual</a:t>
+              <a:t>&lt;=  menor igual</a:t>
             </a:r>
           </a:p>
         </p:txBody>
@@ -10419,7 +10339,7 @@
                 <a:latin typeface="Times New Roman" panose="02020603050405020304" pitchFamily="18" charset="0"/>
                 <a:cs typeface="Times New Roman" panose="02020603050405020304" pitchFamily="18" charset="0"/>
               </a:rPr>
-              <a:t>("Informe sua idade:");</a:t>
+              <a:t>("Informe sua idade:"));</a:t>
             </a:r>
           </a:p>
           <a:p>
@@ -10444,7 +10364,27 @@
                 <a:latin typeface="Times New Roman" panose="02020603050405020304" pitchFamily="18" charset="0"/>
                 <a:cs typeface="Times New Roman" panose="02020603050405020304" pitchFamily="18" charset="0"/>
               </a:rPr>
-              <a:t>("Meu nome é: " + idade);</a:t>
+              <a:t>("Meu nome é: " + </a:t>
+            </a:r>
+            <a:r>
+              <a:rPr lang="pt-BR" b="1" dirty="0" err="1">
+                <a:solidFill>
+                  <a:srgbClr val="FF0000"/>
+                </a:solidFill>
+                <a:latin typeface="Times New Roman" panose="02020603050405020304" pitchFamily="18" charset="0"/>
+                <a:cs typeface="Times New Roman" panose="02020603050405020304" pitchFamily="18" charset="0"/>
+              </a:rPr>
+              <a:t>str</a:t>
+            </a:r>
+            <a:r>
+              <a:rPr lang="pt-BR" dirty="0">
+                <a:solidFill>
+                  <a:schemeClr val="tx1"/>
+                </a:solidFill>
+                <a:latin typeface="Times New Roman" panose="02020603050405020304" pitchFamily="18" charset="0"/>
+                <a:cs typeface="Times New Roman" panose="02020603050405020304" pitchFamily="18" charset="0"/>
+              </a:rPr>
+              <a:t>(idade));</a:t>
             </a:r>
           </a:p>
           <a:p>
@@ -10501,7 +10441,7 @@
                 <a:latin typeface="Times New Roman" panose="02020603050405020304" pitchFamily="18" charset="0"/>
                 <a:cs typeface="Times New Roman" panose="02020603050405020304" pitchFamily="18" charset="0"/>
               </a:rPr>
-              <a:t>("Informe o salário:");</a:t>
+              <a:t>("Informe o salário:“));</a:t>
             </a:r>
           </a:p>
           <a:p>
@@ -10526,7 +10466,27 @@
                 <a:latin typeface="Times New Roman" panose="02020603050405020304" pitchFamily="18" charset="0"/>
                 <a:cs typeface="Times New Roman" panose="02020603050405020304" pitchFamily="18" charset="0"/>
               </a:rPr>
-              <a:t>("Meu nome é: " + salario);</a:t>
+              <a:t>("Meu nome é: " + </a:t>
+            </a:r>
+            <a:r>
+              <a:rPr lang="pt-BR" b="1" dirty="0" err="1">
+                <a:solidFill>
+                  <a:srgbClr val="FF0000"/>
+                </a:solidFill>
+                <a:latin typeface="Times New Roman" panose="02020603050405020304" pitchFamily="18" charset="0"/>
+                <a:cs typeface="Times New Roman" panose="02020603050405020304" pitchFamily="18" charset="0"/>
+              </a:rPr>
+              <a:t>str</a:t>
+            </a:r>
+            <a:r>
+              <a:rPr lang="pt-BR" dirty="0">
+                <a:solidFill>
+                  <a:schemeClr val="tx1"/>
+                </a:solidFill>
+                <a:latin typeface="Times New Roman" panose="02020603050405020304" pitchFamily="18" charset="0"/>
+                <a:cs typeface="Times New Roman" panose="02020603050405020304" pitchFamily="18" charset="0"/>
+              </a:rPr>
+              <a:t>(salario));</a:t>
             </a:r>
           </a:p>
           <a:p>
@@ -11623,7 +11583,7 @@
                 <a:latin typeface="Times New Roman" panose="02020603050405020304" pitchFamily="18" charset="0"/>
                 <a:cs typeface="Times New Roman" panose="02020603050405020304" pitchFamily="18" charset="0"/>
               </a:rPr>
-              <a:t> sexo == "masculino":</a:t>
+              <a:t> (sexo == "masculino"):</a:t>
             </a:r>
           </a:p>
           <a:p>
@@ -11675,7 +11635,7 @@
                 <a:latin typeface="Times New Roman" panose="02020603050405020304" pitchFamily="18" charset="0"/>
                 <a:cs typeface="Times New Roman" panose="02020603050405020304" pitchFamily="18" charset="0"/>
               </a:rPr>
-              <a:t> sexo == "feminino":</a:t>
+              <a:t> (sexo == "feminino"):</a:t>
             </a:r>
           </a:p>
           <a:p>
@@ -11974,6 +11934,16 @@
               <a:t>else</a:t>
             </a:r>
             <a:r>
+              <a:rPr lang="pt-BR" b="1" dirty="0">
+                <a:solidFill>
+                  <a:schemeClr val="tx1"/>
+                </a:solidFill>
+                <a:latin typeface="Times New Roman" panose="02020603050405020304" pitchFamily="18" charset="0"/>
+                <a:cs typeface="Times New Roman" panose="02020603050405020304" pitchFamily="18" charset="0"/>
+              </a:rPr>
+              <a:t>:</a:t>
+            </a:r>
+            <a:r>
               <a:rPr lang="pt-BR" dirty="0">
                 <a:solidFill>
                   <a:schemeClr val="tx1"/>
@@ -12577,7 +12547,7 @@
                 <a:latin typeface="Times New Roman" panose="02020603050405020304" pitchFamily="18" charset="0"/>
                 <a:cs typeface="Times New Roman" panose="02020603050405020304" pitchFamily="18" charset="0"/>
               </a:rPr>
-              <a:t> sexo == "masculino":</a:t>
+              <a:t> (sexo == "masculino«):</a:t>
             </a:r>
           </a:p>
           <a:p>
@@ -12607,7 +12577,7 @@
                 <a:latin typeface="Times New Roman" panose="02020603050405020304" pitchFamily="18" charset="0"/>
                 <a:cs typeface="Times New Roman" panose="02020603050405020304" pitchFamily="18" charset="0"/>
               </a:rPr>
-              <a:t>else:</a:t>
+              <a:t>else: # está ok</a:t>
             </a:r>
             <a:endParaRPr lang="it-IT" dirty="0">
               <a:solidFill>
@@ -18114,7 +18084,7 @@
                 <a:latin typeface="Times New Roman" panose="02020603050405020304" pitchFamily="18" charset="0"/>
                 <a:cs typeface="Times New Roman" panose="02020603050405020304" pitchFamily="18" charset="0"/>
               </a:rPr>
-              <a:t> --global usern.name “</a:t>
+              <a:t> --global user.name “</a:t>
             </a:r>
             <a:r>
               <a:rPr lang="pt-BR" b="1" dirty="0">
@@ -18191,7 +18161,7 @@
                 <a:latin typeface="Times New Roman" panose="02020603050405020304" pitchFamily="18" charset="0"/>
                 <a:cs typeface="Times New Roman" panose="02020603050405020304" pitchFamily="18" charset="0"/>
               </a:rPr>
-              <a:t>usern.email</a:t>
+              <a:t>user.email</a:t>
             </a:r>
             <a:r>
               <a:rPr lang="pt-BR" b="1" dirty="0">

</xml_diff>